<commit_message>
Added searching algorithms presentation
</commit_message>
<xml_diff>
--- a/02_Sorting_Algorithms/Nasko/02_Sorting algorithms.pptx
+++ b/02_Sorting_Algorithms/Nasko/02_Sorting algorithms.pptx
@@ -9,10 +9,12 @@
     <p:sldId id="257" r:id="rId3"/>
     <p:sldId id="258" r:id="rId4"/>
     <p:sldId id="260" r:id="rId5"/>
-    <p:sldId id="262" r:id="rId6"/>
-    <p:sldId id="263" r:id="rId7"/>
-    <p:sldId id="259" r:id="rId8"/>
-    <p:sldId id="261" r:id="rId9"/>
+    <p:sldId id="265" r:id="rId6"/>
+    <p:sldId id="262" r:id="rId7"/>
+    <p:sldId id="263" r:id="rId8"/>
+    <p:sldId id="259" r:id="rId9"/>
+    <p:sldId id="261" r:id="rId10"/>
+    <p:sldId id="264" r:id="rId11"/>
   </p:sldIdLst>
   <p:sldSz cx="12192000" cy="6858000"/>
   <p:notesSz cx="6858000" cy="9144000"/>
@@ -111,6 +113,11 @@
       </a:defRPr>
     </a:lvl9pPr>
   </p:defaultTextStyle>
+  <p:extLst>
+    <p:ext uri="{EFAFB233-063F-42B5-8137-9DF3F51BA10A}">
+      <p15:sldGuideLst xmlns:p15="http://schemas.microsoft.com/office/powerpoint/2012/main"/>
+    </p:ext>
+  </p:extLst>
 </p:presentation>
 </file>
 
@@ -4390,7 +4397,7 @@
           <a:p>
             <a:fld id="{48A87A34-81AB-432B-8DAE-1953F412C126}" type="datetimeFigureOut">
               <a:rPr lang="en-US" dirty="0"/>
-              <a:t>10/12/2022</a:t>
+              <a:t>10/13/2022</a:t>
             </a:fld>
             <a:endParaRPr lang="en-US" dirty="0"/>
           </a:p>
@@ -4652,7 +4659,7 @@
           <a:p>
             <a:fld id="{48A87A34-81AB-432B-8DAE-1953F412C126}" type="datetimeFigureOut">
               <a:rPr lang="en-US" dirty="0"/>
-              <a:t>10/12/2022</a:t>
+              <a:t>10/13/2022</a:t>
             </a:fld>
             <a:endParaRPr lang="en-US" dirty="0"/>
           </a:p>
@@ -4843,7 +4850,7 @@
           <a:p>
             <a:fld id="{48A87A34-81AB-432B-8DAE-1953F412C126}" type="datetimeFigureOut">
               <a:rPr lang="en-US" dirty="0"/>
-              <a:t>10/12/2022</a:t>
+              <a:t>10/13/2022</a:t>
             </a:fld>
             <a:endParaRPr lang="en-US" dirty="0"/>
           </a:p>
@@ -5101,7 +5108,7 @@
           <a:p>
             <a:fld id="{48A87A34-81AB-432B-8DAE-1953F412C126}" type="datetimeFigureOut">
               <a:rPr lang="en-US" dirty="0"/>
-              <a:t>10/12/2022</a:t>
+              <a:t>10/13/2022</a:t>
             </a:fld>
             <a:endParaRPr lang="en-US" dirty="0"/>
           </a:p>
@@ -5530,7 +5537,7 @@
           <a:p>
             <a:fld id="{48A87A34-81AB-432B-8DAE-1953F412C126}" type="datetimeFigureOut">
               <a:rPr lang="en-US" dirty="0"/>
-              <a:t>10/12/2022</a:t>
+              <a:t>10/13/2022</a:t>
             </a:fld>
             <a:endParaRPr lang="en-US" dirty="0"/>
           </a:p>
@@ -6071,7 +6078,7 @@
           <a:p>
             <a:fld id="{48A87A34-81AB-432B-8DAE-1953F412C126}" type="datetimeFigureOut">
               <a:rPr lang="en-US" dirty="0"/>
-              <a:t>10/12/2022</a:t>
+              <a:t>10/13/2022</a:t>
             </a:fld>
             <a:endParaRPr lang="en-US" dirty="0"/>
           </a:p>
@@ -6786,7 +6793,7 @@
           <a:p>
             <a:fld id="{48A87A34-81AB-432B-8DAE-1953F412C126}" type="datetimeFigureOut">
               <a:rPr lang="en-US" dirty="0"/>
-              <a:t>10/12/2022</a:t>
+              <a:t>10/13/2022</a:t>
             </a:fld>
             <a:endParaRPr lang="en-US" dirty="0"/>
           </a:p>
@@ -6951,7 +6958,7 @@
           <a:p>
             <a:fld id="{48A87A34-81AB-432B-8DAE-1953F412C126}" type="datetimeFigureOut">
               <a:rPr lang="en-US" dirty="0"/>
-              <a:t>10/12/2022</a:t>
+              <a:t>10/13/2022</a:t>
             </a:fld>
             <a:endParaRPr lang="en-US" dirty="0"/>
           </a:p>
@@ -7126,7 +7133,7 @@
           <a:p>
             <a:fld id="{48A87A34-81AB-432B-8DAE-1953F412C126}" type="datetimeFigureOut">
               <a:rPr lang="en-US" dirty="0"/>
-              <a:t>10/12/2022</a:t>
+              <a:t>10/13/2022</a:t>
             </a:fld>
             <a:endParaRPr lang="en-US" dirty="0"/>
           </a:p>
@@ -7291,7 +7298,7 @@
           <a:p>
             <a:fld id="{48A87A34-81AB-432B-8DAE-1953F412C126}" type="datetimeFigureOut">
               <a:rPr lang="en-US" dirty="0"/>
-              <a:t>10/12/2022</a:t>
+              <a:t>10/13/2022</a:t>
             </a:fld>
             <a:endParaRPr lang="en-US" dirty="0"/>
           </a:p>
@@ -7536,7 +7543,7 @@
           <a:p>
             <a:fld id="{48A87A34-81AB-432B-8DAE-1953F412C126}" type="datetimeFigureOut">
               <a:rPr lang="en-US" dirty="0"/>
-              <a:t>10/12/2022</a:t>
+              <a:t>10/13/2022</a:t>
             </a:fld>
             <a:endParaRPr lang="en-US" dirty="0"/>
           </a:p>
@@ -7763,7 +7770,7 @@
           <a:p>
             <a:fld id="{48A87A34-81AB-432B-8DAE-1953F412C126}" type="datetimeFigureOut">
               <a:rPr lang="en-US" dirty="0"/>
-              <a:t>10/12/2022</a:t>
+              <a:t>10/13/2022</a:t>
             </a:fld>
             <a:endParaRPr lang="en-US" dirty="0"/>
           </a:p>
@@ -8139,7 +8146,7 @@
           <a:p>
             <a:fld id="{48A87A34-81AB-432B-8DAE-1953F412C126}" type="datetimeFigureOut">
               <a:rPr lang="en-US" dirty="0"/>
-              <a:t>10/12/2022</a:t>
+              <a:t>10/13/2022</a:t>
             </a:fld>
             <a:endParaRPr lang="en-US" dirty="0"/>
           </a:p>
@@ -8252,7 +8259,7 @@
           <a:p>
             <a:fld id="{48A87A34-81AB-432B-8DAE-1953F412C126}" type="datetimeFigureOut">
               <a:rPr lang="en-US" dirty="0"/>
-              <a:t>10/12/2022</a:t>
+              <a:t>10/13/2022</a:t>
             </a:fld>
             <a:endParaRPr lang="en-US" dirty="0"/>
           </a:p>
@@ -8342,7 +8349,7 @@
           <a:p>
             <a:fld id="{48A87A34-81AB-432B-8DAE-1953F412C126}" type="datetimeFigureOut">
               <a:rPr lang="en-US" dirty="0"/>
-              <a:t>10/12/2022</a:t>
+              <a:t>10/13/2022</a:t>
             </a:fld>
             <a:endParaRPr lang="en-US" dirty="0"/>
           </a:p>
@@ -8586,7 +8593,7 @@
           <a:p>
             <a:fld id="{48A87A34-81AB-432B-8DAE-1953F412C126}" type="datetimeFigureOut">
               <a:rPr lang="en-US" dirty="0"/>
-              <a:t>10/12/2022</a:t>
+              <a:t>10/13/2022</a:t>
             </a:fld>
             <a:endParaRPr lang="en-US" dirty="0"/>
           </a:p>
@@ -8861,7 +8868,7 @@
           <a:p>
             <a:fld id="{48A87A34-81AB-432B-8DAE-1953F412C126}" type="datetimeFigureOut">
               <a:rPr lang="en-US" dirty="0"/>
-              <a:t>10/12/2022</a:t>
+              <a:t>10/13/2022</a:t>
             </a:fld>
             <a:endParaRPr lang="en-US" dirty="0"/>
           </a:p>
@@ -11934,7 +11941,7 @@
             <a:fld id="{48A87A34-81AB-432B-8DAE-1953F412C126}" type="datetimeFigureOut">
               <a:rPr lang="en-US" dirty="0"/>
               <a:pPr/>
-              <a:t>10/12/2022</a:t>
+              <a:t>10/13/2022</a:t>
             </a:fld>
             <a:endParaRPr lang="en-US" dirty="0"/>
           </a:p>
@@ -12420,6 +12427,69 @@
 </p:sld>
 </file>
 
+<file path=ppt/slides/slide10.xml><?xml version="1.0" encoding="utf-8"?>
+<p:sld xmlns:a="http://schemas.openxmlformats.org/drawingml/2006/main" xmlns:r="http://schemas.openxmlformats.org/officeDocument/2006/relationships" xmlns:p="http://schemas.openxmlformats.org/presentationml/2006/main">
+  <p:cSld>
+    <p:spTree>
+      <p:nvGrpSpPr>
+        <p:cNvPr id="1" name=""/>
+        <p:cNvGrpSpPr/>
+        <p:nvPr/>
+      </p:nvGrpSpPr>
+      <p:grpSpPr>
+        <a:xfrm>
+          <a:off x="0" y="0"/>
+          <a:ext cx="0" cy="0"/>
+          <a:chOff x="0" y="0"/>
+          <a:chExt cx="0" cy="0"/>
+        </a:xfrm>
+      </p:grpSpPr>
+      <p:sp>
+        <p:nvSpPr>
+          <p:cNvPr id="2" name="Title 1">
+            <a:extLst>
+              <a:ext uri="{FF2B5EF4-FFF2-40B4-BE49-F238E27FC236}">
+                <a16:creationId xmlns:a16="http://schemas.microsoft.com/office/drawing/2014/main" id="{F4E155CC-04E3-9EA4-C540-1E83A81284E9}"/>
+              </a:ext>
+            </a:extLst>
+          </p:cNvPr>
+          <p:cNvSpPr>
+            <a:spLocks noGrp="1"/>
+          </p:cNvSpPr>
+          <p:nvPr>
+            <p:ph type="title"/>
+          </p:nvPr>
+        </p:nvSpPr>
+        <p:spPr>
+          <a:xfrm>
+            <a:off x="2060209" y="2346206"/>
+            <a:ext cx="9905998" cy="1478570"/>
+          </a:xfrm>
+        </p:spPr>
+        <p:txBody>
+          <a:bodyPr/>
+          <a:lstStyle/>
+          <a:p>
+            <a:r>
+              <a:rPr lang="bg-BG" dirty="0"/>
+              <a:t>Благодаря ви за вниманието!!!</a:t>
+            </a:r>
+          </a:p>
+        </p:txBody>
+      </p:sp>
+    </p:spTree>
+    <p:extLst>
+      <p:ext uri="{BB962C8B-B14F-4D97-AF65-F5344CB8AC3E}">
+        <p14:creationId xmlns:p14="http://schemas.microsoft.com/office/powerpoint/2010/main" val="3067854904"/>
+      </p:ext>
+    </p:extLst>
+  </p:cSld>
+  <p:clrMapOvr>
+    <a:masterClrMapping/>
+  </p:clrMapOvr>
+</p:sld>
+</file>
+
 <file path=ppt/slides/slide2.xml><?xml version="1.0" encoding="utf-8"?>
 <p:sld xmlns:a="http://schemas.openxmlformats.org/drawingml/2006/main" xmlns:r="http://schemas.openxmlformats.org/officeDocument/2006/relationships" xmlns:p="http://schemas.openxmlformats.org/presentationml/2006/main">
   <p:cSld>
@@ -12773,6 +12843,184 @@
           <p:cNvPr id="2" name="Title 1">
             <a:extLst>
               <a:ext uri="{FF2B5EF4-FFF2-40B4-BE49-F238E27FC236}">
+                <a16:creationId xmlns:a16="http://schemas.microsoft.com/office/drawing/2014/main" id="{36F2A18E-4993-92B6-AE8F-BD4E9AC150DA}"/>
+              </a:ext>
+            </a:extLst>
+          </p:cNvPr>
+          <p:cNvSpPr>
+            <a:spLocks noGrp="1"/>
+          </p:cNvSpPr>
+          <p:nvPr>
+            <p:ph type="title"/>
+          </p:nvPr>
+        </p:nvSpPr>
+        <p:spPr/>
+        <p:txBody>
+          <a:bodyPr/>
+          <a:lstStyle/>
+          <a:p>
+            <a:r>
+              <a:rPr lang="en-US" dirty="0"/>
+              <a:t>Tips and tricks</a:t>
+            </a:r>
+            <a:endParaRPr lang="bg-BG" dirty="0"/>
+          </a:p>
+        </p:txBody>
+      </p:sp>
+      <p:sp>
+        <p:nvSpPr>
+          <p:cNvPr id="3" name="Content Placeholder 2">
+            <a:extLst>
+              <a:ext uri="{FF2B5EF4-FFF2-40B4-BE49-F238E27FC236}">
+                <a16:creationId xmlns:a16="http://schemas.microsoft.com/office/drawing/2014/main" id="{F723DC3C-52F9-83B4-B93A-9E9BE970DEBF}"/>
+              </a:ext>
+            </a:extLst>
+          </p:cNvPr>
+          <p:cNvSpPr>
+            <a:spLocks noGrp="1"/>
+          </p:cNvSpPr>
+          <p:nvPr>
+            <p:ph idx="1"/>
+          </p:nvPr>
+        </p:nvSpPr>
+        <p:spPr/>
+        <p:txBody>
+          <a:bodyPr/>
+          <a:lstStyle/>
+          <a:p>
+            <a:r>
+              <a:rPr lang="en-US" dirty="0" err="1"/>
+              <a:t>ios_base</a:t>
+            </a:r>
+            <a:r>
+              <a:rPr lang="en-US" dirty="0"/>
+              <a:t>::</a:t>
+            </a:r>
+            <a:r>
+              <a:rPr lang="en-US" dirty="0" err="1"/>
+              <a:t>sync_with_stdio</a:t>
+            </a:r>
+            <a:r>
+              <a:rPr lang="en-US" dirty="0"/>
+              <a:t>(false);</a:t>
+            </a:r>
+          </a:p>
+          <a:p>
+            <a:r>
+              <a:rPr lang="en-US" dirty="0"/>
+              <a:t> </a:t>
+            </a:r>
+            <a:r>
+              <a:rPr lang="en-US" dirty="0" err="1"/>
+              <a:t>cin.tie</a:t>
+            </a:r>
+            <a:r>
+              <a:rPr lang="en-US" dirty="0"/>
+              <a:t>(</a:t>
+            </a:r>
+            <a:r>
+              <a:rPr lang="en-US" dirty="0" err="1"/>
+              <a:t>nullptr</a:t>
+            </a:r>
+            <a:r>
+              <a:rPr lang="en-US" dirty="0"/>
+              <a:t>);</a:t>
+            </a:r>
+          </a:p>
+          <a:p>
+            <a:r>
+              <a:rPr lang="en-US" b="0" i="0" dirty="0" err="1">
+                <a:effectLst/>
+                <a:latin typeface="ui-monospace"/>
+              </a:rPr>
+              <a:t>printf</a:t>
+            </a:r>
+            <a:r>
+              <a:rPr lang="en-US" b="0" i="0" dirty="0">
+                <a:solidFill>
+                  <a:srgbClr val="C9D1D9"/>
+                </a:solidFill>
+                <a:effectLst/>
+                <a:latin typeface="ui-monospace"/>
+              </a:rPr>
+              <a:t>(</a:t>
+            </a:r>
+            <a:r>
+              <a:rPr lang="en-US" b="0" i="0" dirty="0">
+                <a:effectLst/>
+                <a:latin typeface="ui-monospace"/>
+              </a:rPr>
+              <a:t>"%d\n"</a:t>
+            </a:r>
+            <a:r>
+              <a:rPr lang="en-US" b="0" i="0" dirty="0">
+                <a:solidFill>
+                  <a:srgbClr val="C9D1D9"/>
+                </a:solidFill>
+                <a:effectLst/>
+                <a:latin typeface="ui-monospace"/>
+              </a:rPr>
+              <a:t>, </a:t>
+            </a:r>
+            <a:r>
+              <a:rPr lang="en-US" b="0" i="0" dirty="0" err="1">
+                <a:solidFill>
+                  <a:srgbClr val="C9D1D9"/>
+                </a:solidFill>
+                <a:effectLst/>
+                <a:latin typeface="ui-monospace"/>
+              </a:rPr>
+              <a:t>minNumber</a:t>
+            </a:r>
+            <a:r>
+              <a:rPr lang="en-US" b="0" i="0" dirty="0">
+                <a:solidFill>
+                  <a:srgbClr val="C9D1D9"/>
+                </a:solidFill>
+                <a:effectLst/>
+                <a:latin typeface="ui-monospace"/>
+              </a:rPr>
+              <a:t>);</a:t>
+            </a:r>
+            <a:endParaRPr lang="bg-BG" dirty="0"/>
+          </a:p>
+        </p:txBody>
+      </p:sp>
+    </p:spTree>
+    <p:extLst>
+      <p:ext uri="{BB962C8B-B14F-4D97-AF65-F5344CB8AC3E}">
+        <p14:creationId xmlns:p14="http://schemas.microsoft.com/office/powerpoint/2010/main" val="1351590288"/>
+      </p:ext>
+    </p:extLst>
+  </p:cSld>
+  <p:clrMapOvr>
+    <a:masterClrMapping/>
+  </p:clrMapOvr>
+</p:sld>
+</file>
+
+<file path=ppt/slides/slide6.xml><?xml version="1.0" encoding="utf-8"?>
+<p:sld xmlns:a="http://schemas.openxmlformats.org/drawingml/2006/main" xmlns:r="http://schemas.openxmlformats.org/officeDocument/2006/relationships" xmlns:p="http://schemas.openxmlformats.org/presentationml/2006/main">
+  <p:cSld>
+    <p:spTree>
+      <p:nvGrpSpPr>
+        <p:cNvPr id="1" name=""/>
+        <p:cNvGrpSpPr/>
+        <p:nvPr/>
+      </p:nvGrpSpPr>
+      <p:grpSpPr>
+        <a:xfrm>
+          <a:off x="0" y="0"/>
+          <a:ext cx="0" cy="0"/>
+          <a:chOff x="0" y="0"/>
+          <a:chExt cx="0" cy="0"/>
+        </a:xfrm>
+      </p:grpSpPr>
+      <p:sp>
+        <p:nvSpPr>
+          <p:cNvPr id="2" name="Title 1">
+            <a:extLst>
+              <a:ext uri="{FF2B5EF4-FFF2-40B4-BE49-F238E27FC236}">
                 <a16:creationId xmlns:a16="http://schemas.microsoft.com/office/drawing/2014/main" id="{4E3FFEC5-2B9D-728D-03BF-4B88F98CB328}"/>
               </a:ext>
             </a:extLst>
@@ -12844,7 +13092,7 @@
 </p:sld>
 </file>
 
-<file path=ppt/slides/slide6.xml><?xml version="1.0" encoding="utf-8"?>
+<file path=ppt/slides/slide7.xml><?xml version="1.0" encoding="utf-8"?>
 <p:sld xmlns:a="http://schemas.openxmlformats.org/drawingml/2006/main" xmlns:r="http://schemas.openxmlformats.org/officeDocument/2006/relationships" xmlns:p="http://schemas.openxmlformats.org/presentationml/2006/main">
   <p:cSld>
     <p:spTree>
@@ -12916,10 +13164,22 @@
               </a:rPr>
               <a:t>https://www.hackerrank.com/contests/sda-hw-2/challenges</a:t>
             </a:r>
-            <a:endParaRPr lang="bg-BG"/>
-          </a:p>
-          <a:p>
-            <a:endParaRPr lang="bg-BG"/>
+            <a:endParaRPr lang="en-US" dirty="0"/>
+          </a:p>
+          <a:p>
+            <a:r>
+              <a:rPr lang="en-US" dirty="0">
+                <a:hlinkClick r:id="rId3"/>
+              </a:rPr>
+              <a:t>https://github.com/NaskoVasilev/SDA_2022-2023/tree/main/Homeworks/02_Homework</a:t>
+            </a:r>
+            <a:endParaRPr lang="en-US" dirty="0"/>
+          </a:p>
+          <a:p>
+            <a:endParaRPr lang="bg-BG" dirty="0"/>
+          </a:p>
+          <a:p>
+            <a:endParaRPr lang="bg-BG" dirty="0"/>
           </a:p>
         </p:txBody>
       </p:sp>
@@ -12936,7 +13196,7 @@
 </p:sld>
 </file>
 
-<file path=ppt/slides/slide7.xml><?xml version="1.0" encoding="utf-8"?>
+<file path=ppt/slides/slide8.xml><?xml version="1.0" encoding="utf-8"?>
 <p:sld xmlns:a="http://schemas.openxmlformats.org/drawingml/2006/main" xmlns:r="http://schemas.openxmlformats.org/officeDocument/2006/relationships" xmlns:p="http://schemas.openxmlformats.org/presentationml/2006/main">
   <p:cSld>
     <p:spTree>
@@ -13099,7 +13359,7 @@
 </p:sld>
 </file>
 
-<file path=ppt/slides/slide8.xml><?xml version="1.0" encoding="utf-8"?>
+<file path=ppt/slides/slide9.xml><?xml version="1.0" encoding="utf-8"?>
 <p:sld xmlns:a="http://schemas.openxmlformats.org/drawingml/2006/main" xmlns:r="http://schemas.openxmlformats.org/officeDocument/2006/relationships" xmlns:p="http://schemas.openxmlformats.org/presentationml/2006/main">
   <p:cSld>
     <p:spTree>

</xml_diff>